<commit_message>
update ui images and documents
update ui images and documents
</commit_message>
<xml_diff>
--- a/LLoydsBankPOC_Manual_Doc.pptx
+++ b/LLoydsBankPOC_Manual_Doc.pptx
@@ -17,10 +17,8 @@
     <p:sldId id="270" r:id="rId11"/>
     <p:sldId id="271" r:id="rId12"/>
     <p:sldId id="272" r:id="rId13"/>
-    <p:sldId id="273" r:id="rId14"/>
-    <p:sldId id="274" r:id="rId15"/>
-    <p:sldId id="276" r:id="rId16"/>
-    <p:sldId id="277" r:id="rId17"/>
+    <p:sldId id="276" r:id="rId14"/>
+    <p:sldId id="277" r:id="rId15"/>
   </p:sldIdLst>
   <p:sldSz cx="12192000" cy="6858000"/>
   <p:notesSz cx="6858000" cy="9144000"/>
@@ -3339,6 +3337,30 @@
           </a:prstGeom>
         </p:spPr>
       </p:pic>
+      <p:pic>
+        <p:nvPicPr>
+          <p:cNvPr id="2" name="Picture 1"/>
+          <p:cNvPicPr>
+            <a:picLocks noChangeAspect="1"/>
+          </p:cNvPicPr>
+          <p:nvPr/>
+        </p:nvPicPr>
+        <p:blipFill>
+          <a:blip r:embed="rId3"/>
+          <a:stretch>
+            <a:fillRect/>
+          </a:stretch>
+        </p:blipFill>
+        <p:spPr>
+          <a:xfrm>
+            <a:off x="2868285" y="267945"/>
+            <a:ext cx="8642495" cy="4861404"/>
+          </a:xfrm>
+          <a:prstGeom prst="rect">
+            <a:avLst/>
+          </a:prstGeom>
+        </p:spPr>
+      </p:pic>
     </p:spTree>
     <p:extLst>
       <p:ext uri="{BB962C8B-B14F-4D97-AF65-F5344CB8AC3E}">
@@ -3393,6 +3415,30 @@
           <a:xfrm>
             <a:off x="263169" y="267945"/>
             <a:ext cx="2397621" cy="1168840"/>
+          </a:xfrm>
+          <a:prstGeom prst="rect">
+            <a:avLst/>
+          </a:prstGeom>
+        </p:spPr>
+      </p:pic>
+      <p:pic>
+        <p:nvPicPr>
+          <p:cNvPr id="2" name="Picture 1"/>
+          <p:cNvPicPr>
+            <a:picLocks noChangeAspect="1"/>
+          </p:cNvPicPr>
+          <p:nvPr/>
+        </p:nvPicPr>
+        <p:blipFill>
+          <a:blip r:embed="rId3"/>
+          <a:stretch>
+            <a:fillRect/>
+          </a:stretch>
+        </p:blipFill>
+        <p:spPr>
+          <a:xfrm>
+            <a:off x="2908662" y="267945"/>
+            <a:ext cx="9047913" cy="5089451"/>
           </a:xfrm>
           <a:prstGeom prst="rect">
             <a:avLst/>
@@ -3459,126 +3505,6 @@
           </a:prstGeom>
         </p:spPr>
       </p:pic>
-    </p:spTree>
-    <p:extLst>
-      <p:ext uri="{BB962C8B-B14F-4D97-AF65-F5344CB8AC3E}">
-        <p14:creationId xmlns:p14="http://schemas.microsoft.com/office/powerpoint/2010/main" val="2024175435"/>
-      </p:ext>
-    </p:extLst>
-  </p:cSld>
-  <p:clrMapOvr>
-    <a:masterClrMapping/>
-  </p:clrMapOvr>
-</p:sld>
-</file>
-
-<file path=ppt/slides/slide14.xml><?xml version="1.0" encoding="utf-8"?>
-<p:sld xmlns:a="http://schemas.openxmlformats.org/drawingml/2006/main" xmlns:r="http://schemas.openxmlformats.org/officeDocument/2006/relationships" xmlns:p="http://schemas.openxmlformats.org/presentationml/2006/main">
-  <p:cSld>
-    <p:spTree>
-      <p:nvGrpSpPr>
-        <p:cNvPr id="1" name=""/>
-        <p:cNvGrpSpPr/>
-        <p:nvPr/>
-      </p:nvGrpSpPr>
-      <p:grpSpPr>
-        <a:xfrm>
-          <a:off x="0" y="0"/>
-          <a:ext cx="0" cy="0"/>
-          <a:chOff x="0" y="0"/>
-          <a:chExt cx="0" cy="0"/>
-        </a:xfrm>
-      </p:grpSpPr>
-      <p:pic>
-        <p:nvPicPr>
-          <p:cNvPr id="4" name="Picture 3"/>
-          <p:cNvPicPr>
-            <a:picLocks noChangeAspect="1"/>
-          </p:cNvPicPr>
-          <p:nvPr/>
-        </p:nvPicPr>
-        <p:blipFill>
-          <a:blip r:embed="rId2">
-            <a:extLst>
-              <a:ext uri="{28A0092B-C50C-407E-A947-70E740481C1C}">
-                <a14:useLocalDpi xmlns:a14="http://schemas.microsoft.com/office/drawing/2010/main" val="0"/>
-              </a:ext>
-            </a:extLst>
-          </a:blip>
-          <a:stretch>
-            <a:fillRect/>
-          </a:stretch>
-        </p:blipFill>
-        <p:spPr>
-          <a:xfrm>
-            <a:off x="263169" y="267945"/>
-            <a:ext cx="2397621" cy="1168840"/>
-          </a:xfrm>
-          <a:prstGeom prst="rect">
-            <a:avLst/>
-          </a:prstGeom>
-        </p:spPr>
-      </p:pic>
-    </p:spTree>
-    <p:extLst>
-      <p:ext uri="{BB962C8B-B14F-4D97-AF65-F5344CB8AC3E}">
-        <p14:creationId xmlns:p14="http://schemas.microsoft.com/office/powerpoint/2010/main" val="2114382673"/>
-      </p:ext>
-    </p:extLst>
-  </p:cSld>
-  <p:clrMapOvr>
-    <a:masterClrMapping/>
-  </p:clrMapOvr>
-</p:sld>
-</file>
-
-<file path=ppt/slides/slide15.xml><?xml version="1.0" encoding="utf-8"?>
-<p:sld xmlns:a="http://schemas.openxmlformats.org/drawingml/2006/main" xmlns:r="http://schemas.openxmlformats.org/officeDocument/2006/relationships" xmlns:p="http://schemas.openxmlformats.org/presentationml/2006/main">
-  <p:cSld>
-    <p:spTree>
-      <p:nvGrpSpPr>
-        <p:cNvPr id="1" name=""/>
-        <p:cNvGrpSpPr/>
-        <p:nvPr/>
-      </p:nvGrpSpPr>
-      <p:grpSpPr>
-        <a:xfrm>
-          <a:off x="0" y="0"/>
-          <a:ext cx="0" cy="0"/>
-          <a:chOff x="0" y="0"/>
-          <a:chExt cx="0" cy="0"/>
-        </a:xfrm>
-      </p:grpSpPr>
-      <p:pic>
-        <p:nvPicPr>
-          <p:cNvPr id="4" name="Picture 3"/>
-          <p:cNvPicPr>
-            <a:picLocks noChangeAspect="1"/>
-          </p:cNvPicPr>
-          <p:nvPr/>
-        </p:nvPicPr>
-        <p:blipFill>
-          <a:blip r:embed="rId2">
-            <a:extLst>
-              <a:ext uri="{28A0092B-C50C-407E-A947-70E740481C1C}">
-                <a14:useLocalDpi xmlns:a14="http://schemas.microsoft.com/office/drawing/2010/main" val="0"/>
-              </a:ext>
-            </a:extLst>
-          </a:blip>
-          <a:stretch>
-            <a:fillRect/>
-          </a:stretch>
-        </p:blipFill>
-        <p:spPr>
-          <a:xfrm>
-            <a:off x="263169" y="267945"/>
-            <a:ext cx="2397621" cy="1168840"/>
-          </a:xfrm>
-          <a:prstGeom prst="rect">
-            <a:avLst/>
-          </a:prstGeom>
-        </p:spPr>
-      </p:pic>
       <p:sp>
         <p:nvSpPr>
           <p:cNvPr id="6" name="Title 1"/>
@@ -3714,7 +3640,7 @@
 </p:sld>
 </file>
 
-<file path=ppt/slides/slide16.xml><?xml version="1.0" encoding="utf-8"?>
+<file path=ppt/slides/slide14.xml><?xml version="1.0" encoding="utf-8"?>
 <p:sld xmlns:a="http://schemas.openxmlformats.org/drawingml/2006/main" xmlns:r="http://schemas.openxmlformats.org/officeDocument/2006/relationships" xmlns:p="http://schemas.openxmlformats.org/presentationml/2006/main">
   <p:cSld>
     <p:spTree>

</xml_diff>